<commit_message>
m2 output, updates to m1, m3.
</commit_message>
<xml_diff>
--- a/book/lectures/AUR_2023_Module3_GLM.pptx
+++ b/book/lectures/AUR_2023_Module3_GLM.pptx
@@ -5,46 +5,48 @@
     <p:sldMasterId id="2147483648" r:id="rId1"/>
   </p:sldMasterIdLst>
   <p:notesMasterIdLst>
-    <p:notesMasterId r:id="rId8"/>
+    <p:notesMasterId r:id="rId10"/>
   </p:notesMasterIdLst>
   <p:sldIdLst>
     <p:sldId id="256" r:id="rId2"/>
     <p:sldId id="257" r:id="rId3"/>
     <p:sldId id="258" r:id="rId4"/>
     <p:sldId id="259" r:id="rId5"/>
-    <p:sldId id="261" r:id="rId6"/>
-    <p:sldId id="260" r:id="rId7"/>
+    <p:sldId id="262" r:id="rId6"/>
+    <p:sldId id="263" r:id="rId7"/>
+    <p:sldId id="261" r:id="rId8"/>
+    <p:sldId id="260" r:id="rId9"/>
   </p:sldIdLst>
   <p:sldSz cx="12192000" cy="6858000"/>
   <p:notesSz cx="6858000" cy="9144000"/>
   <p:embeddedFontLst>
     <p:embeddedFont>
       <p:font typeface="Calibri" panose="020F0502020204030204" pitchFamily="34" charset="0"/>
-      <p:regular r:id="rId9"/>
-      <p:bold r:id="rId10"/>
-      <p:italic r:id="rId11"/>
-      <p:boldItalic r:id="rId12"/>
+      <p:regular r:id="rId11"/>
+      <p:bold r:id="rId12"/>
+      <p:italic r:id="rId13"/>
+      <p:boldItalic r:id="rId14"/>
     </p:embeddedFont>
     <p:embeddedFont>
       <p:font typeface="Consolas" panose="020B0609020204030204" pitchFamily="49" charset="0"/>
-      <p:regular r:id="rId13"/>
-      <p:bold r:id="rId14"/>
-      <p:italic r:id="rId15"/>
-      <p:boldItalic r:id="rId16"/>
+      <p:regular r:id="rId15"/>
+      <p:bold r:id="rId16"/>
+      <p:italic r:id="rId17"/>
+      <p:boldItalic r:id="rId18"/>
     </p:embeddedFont>
     <p:embeddedFont>
       <p:font typeface="Quattrocento Sans" panose="020B0502050000020003" pitchFamily="34" charset="0"/>
-      <p:regular r:id="rId17"/>
-      <p:bold r:id="rId18"/>
-      <p:italic r:id="rId19"/>
-      <p:boldItalic r:id="rId20"/>
+      <p:regular r:id="rId19"/>
+      <p:bold r:id="rId20"/>
+      <p:italic r:id="rId21"/>
+      <p:boldItalic r:id="rId22"/>
     </p:embeddedFont>
     <p:embeddedFont>
       <p:font typeface="Verdana" panose="020B0604030504040204" pitchFamily="34" charset="0"/>
-      <p:regular r:id="rId21"/>
-      <p:bold r:id="rId22"/>
-      <p:italic r:id="rId23"/>
-      <p:boldItalic r:id="rId24"/>
+      <p:regular r:id="rId23"/>
+      <p:bold r:id="rId24"/>
+      <p:italic r:id="rId25"/>
+      <p:boldItalic r:id="rId26"/>
     </p:embeddedFont>
   </p:embeddedFontLst>
   <p:defaultTextStyle>
@@ -292,7 +294,7 @@
       </p15:sldGuideLst>
     </p:ext>
     <p:ext uri="http://customooxmlschemas.google.com/">
-      <go:slidesCustomData xmlns="" xmlns:mc="http://schemas.openxmlformats.org/markup-compatibility/2006" xmlns:mv="urn:schemas-microsoft-com:mac:vml" xmlns:c="http://schemas.openxmlformats.org/drawingml/2006/chart" xmlns:dgm="http://schemas.openxmlformats.org/drawingml/2006/diagram" xmlns:o="urn:schemas-microsoft-com:office:office" xmlns:v="urn:schemas-microsoft-com:vml" xmlns:pvml="urn:schemas-microsoft-com:office:powerpoint" xmlns:com="http://schemas.openxmlformats.org/drawingml/2006/compatibility" xmlns:p14="http://schemas.microsoft.com/office/powerpoint/2010/main" xmlns:p15="http://schemas.microsoft.com/office/powerpoint/2012/main" xmlns:ahyp="http://schemas.microsoft.com/office/drawing/2018/hyperlinkcolor" xmlns:go="http://customooxmlschemas.google.com/" r:id="rId25" roundtripDataSignature="AMtx7mjJUqhzRCG90pmUVeTJ3qvI+i8ayQ=="/>
+      <go:slidesCustomData xmlns="" xmlns:mc="http://schemas.openxmlformats.org/markup-compatibility/2006" xmlns:mv="urn:schemas-microsoft-com:mac:vml" xmlns:c="http://schemas.openxmlformats.org/drawingml/2006/chart" xmlns:dgm="http://schemas.openxmlformats.org/drawingml/2006/diagram" xmlns:o="urn:schemas-microsoft-com:office:office" xmlns:v="urn:schemas-microsoft-com:vml" xmlns:pvml="urn:schemas-microsoft-com:office:powerpoint" xmlns:com="http://schemas.openxmlformats.org/drawingml/2006/compatibility" xmlns:p14="http://schemas.microsoft.com/office/powerpoint/2010/main" xmlns:p15="http://schemas.microsoft.com/office/powerpoint/2012/main" xmlns:ahyp="http://schemas.microsoft.com/office/drawing/2018/hyperlinkcolor" xmlns:go="http://customooxmlschemas.google.com/" r:id="rId27" roundtripDataSignature="AMtx7mjJUqhzRCG90pmUVeTJ3qvI+i8ayQ=="/>
     </p:ext>
   </p:extLst>
 </p:presentation>
@@ -2397,7 +2399,7 @@
             </a:pPr>
             <a:fld id="{00000000-1234-1234-1234-123412341234}" type="slidenum">
               <a:rPr lang="en-US"/>
-              <a:t>6</a:t>
+              <a:t>8</a:t>
             </a:fld>
             <a:endParaRPr/>
           </a:p>
@@ -12169,19 +12171,12 @@
           <a:p>
             <a:pPr marL="514350" lvl="1" indent="-171450"/>
             <a:r>
-              <a:rPr lang="en-CA" dirty="0"/>
-              <a:t>Read files into R</a:t>
-            </a:r>
-            <a:br>
-              <a:rPr lang="en-CA" dirty="0"/>
-            </a:br>
-            <a:endParaRPr lang="en-CA" dirty="0"/>
-          </a:p>
-          <a:p>
-            <a:pPr marL="514350" lvl="1" indent="-171450"/>
-            <a:r>
-              <a:rPr lang="en-CA" dirty="0"/>
-              <a:t>Merge tables by a column</a:t>
+              <a:rPr lang="en-CA">
+                <a:solidFill>
+                  <a:schemeClr val="tx1"/>
+                </a:solidFill>
+              </a:rPr>
+              <a:t>Learn to read tables into R and merge tables</a:t>
             </a:r>
             <a:br>
               <a:rPr lang="en-CA" dirty="0"/>
@@ -12234,6 +12229,821 @@
 </file>
 
 <file path=ppt/slides/slide5.xml><?xml version="1.0" encoding="utf-8"?>
+<p:sld xmlns:a="http://schemas.openxmlformats.org/drawingml/2006/main" xmlns:r="http://schemas.openxmlformats.org/officeDocument/2006/relationships" xmlns:p="http://schemas.openxmlformats.org/presentationml/2006/main">
+  <p:cSld>
+    <p:spTree>
+      <p:nvGrpSpPr>
+        <p:cNvPr id="1" name=""/>
+        <p:cNvGrpSpPr/>
+        <p:nvPr/>
+      </p:nvGrpSpPr>
+      <p:grpSpPr>
+        <a:xfrm>
+          <a:off x="0" y="0"/>
+          <a:ext cx="0" cy="0"/>
+          <a:chOff x="0" y="0"/>
+          <a:chExt cx="0" cy="0"/>
+        </a:xfrm>
+      </p:grpSpPr>
+      <p:sp>
+        <p:nvSpPr>
+          <p:cNvPr id="2" name="Title 1">
+            <a:extLst>
+              <a:ext uri="{FF2B5EF4-FFF2-40B4-BE49-F238E27FC236}">
+                <a16:creationId xmlns:a16="http://schemas.microsoft.com/office/drawing/2014/main" id="{285E505F-DB08-A125-5ECA-4C6CCE8AE409}"/>
+              </a:ext>
+            </a:extLst>
+          </p:cNvPr>
+          <p:cNvSpPr>
+            <a:spLocks noGrp="1"/>
+          </p:cNvSpPr>
+          <p:nvPr>
+            <p:ph type="title"/>
+          </p:nvPr>
+        </p:nvSpPr>
+        <p:spPr>
+          <a:xfrm>
+            <a:off x="650310" y="86679"/>
+            <a:ext cx="10515600" cy="1325563"/>
+          </a:xfrm>
+        </p:spPr>
+        <p:txBody>
+          <a:bodyPr>
+            <a:normAutofit/>
+          </a:bodyPr>
+          <a:lstStyle/>
+          <a:p>
+            <a:r>
+              <a:rPr lang="en-US" sz="3200" dirty="0"/>
+              <a:t>Generalized linear models (GLM) for </a:t>
+            </a:r>
+            <a:br>
+              <a:rPr lang="en-US" sz="3200" dirty="0"/>
+            </a:br>
+            <a:r>
+              <a:rPr lang="en-US" sz="3200" dirty="0"/>
+              <a:t>binary response &amp; count data</a:t>
+            </a:r>
+          </a:p>
+        </p:txBody>
+      </p:sp>
+      <p:pic>
+        <p:nvPicPr>
+          <p:cNvPr id="5" name="Picture 4" descr="A graph with black dots and a blue line&#10;&#10;Description automatically generated with low confidence">
+            <a:extLst>
+              <a:ext uri="{FF2B5EF4-FFF2-40B4-BE49-F238E27FC236}">
+                <a16:creationId xmlns:a16="http://schemas.microsoft.com/office/drawing/2014/main" id="{222C2C9E-5707-F706-DDDA-F562C152CA7D}"/>
+              </a:ext>
+            </a:extLst>
+          </p:cNvPr>
+          <p:cNvPicPr>
+            <a:picLocks noChangeAspect="1"/>
+          </p:cNvPicPr>
+          <p:nvPr/>
+        </p:nvPicPr>
+        <p:blipFill rotWithShape="1">
+          <a:blip r:embed="rId2"/>
+          <a:srcRect l="6704" b="10329"/>
+          <a:stretch/>
+        </p:blipFill>
+        <p:spPr>
+          <a:xfrm>
+            <a:off x="1366375" y="2137638"/>
+            <a:ext cx="3722544" cy="3314928"/>
+          </a:xfrm>
+          <a:prstGeom prst="rect">
+            <a:avLst/>
+          </a:prstGeom>
+        </p:spPr>
+      </p:pic>
+      <p:sp>
+        <p:nvSpPr>
+          <p:cNvPr id="9" name="TextBox 8">
+            <a:extLst>
+              <a:ext uri="{FF2B5EF4-FFF2-40B4-BE49-F238E27FC236}">
+                <a16:creationId xmlns:a16="http://schemas.microsoft.com/office/drawing/2014/main" id="{5B1564FB-9D42-ACCC-38AE-9DE8ABCFA561}"/>
+              </a:ext>
+            </a:extLst>
+          </p:cNvPr>
+          <p:cNvSpPr txBox="1"/>
+          <p:nvPr/>
+        </p:nvSpPr>
+        <p:spPr>
+          <a:xfrm>
+            <a:off x="2070118" y="5598127"/>
+            <a:ext cx="2315057" cy="400110"/>
+          </a:xfrm>
+          <a:prstGeom prst="rect">
+            <a:avLst/>
+          </a:prstGeom>
+          <a:noFill/>
+        </p:spPr>
+        <p:txBody>
+          <a:bodyPr wrap="none" rtlCol="0">
+            <a:spAutoFit/>
+          </a:bodyPr>
+          <a:lstStyle/>
+          <a:p>
+            <a:r>
+              <a:rPr lang="en-US" sz="2000" dirty="0" err="1">
+                <a:solidFill>
+                  <a:schemeClr val="accent1"/>
+                </a:solidFill>
+              </a:rPr>
+              <a:t>lm</a:t>
+            </a:r>
+            <a:r>
+              <a:rPr lang="en-US" sz="2000" dirty="0">
+                <a:solidFill>
+                  <a:schemeClr val="accent1"/>
+                </a:solidFill>
+              </a:rPr>
+              <a:t>(y ~ x, data = </a:t>
+            </a:r>
+            <a:r>
+              <a:rPr lang="en-US" sz="2000" dirty="0" err="1">
+                <a:solidFill>
+                  <a:schemeClr val="accent1"/>
+                </a:solidFill>
+              </a:rPr>
+              <a:t>df</a:t>
+            </a:r>
+            <a:r>
+              <a:rPr lang="en-US" sz="2000" dirty="0">
+                <a:solidFill>
+                  <a:schemeClr val="accent1"/>
+                </a:solidFill>
+              </a:rPr>
+              <a:t>)</a:t>
+            </a:r>
+          </a:p>
+        </p:txBody>
+      </p:sp>
+      <p:sp>
+        <p:nvSpPr>
+          <p:cNvPr id="10" name="TextBox 9">
+            <a:extLst>
+              <a:ext uri="{FF2B5EF4-FFF2-40B4-BE49-F238E27FC236}">
+                <a16:creationId xmlns:a16="http://schemas.microsoft.com/office/drawing/2014/main" id="{B0550DC7-1F1D-6476-2AE6-37C822F95B20}"/>
+              </a:ext>
+            </a:extLst>
+          </p:cNvPr>
+          <p:cNvSpPr txBox="1"/>
+          <p:nvPr/>
+        </p:nvSpPr>
+        <p:spPr>
+          <a:xfrm>
+            <a:off x="1503457" y="1429752"/>
+            <a:ext cx="3448380" cy="707886"/>
+          </a:xfrm>
+          <a:prstGeom prst="rect">
+            <a:avLst/>
+          </a:prstGeom>
+          <a:noFill/>
+        </p:spPr>
+        <p:txBody>
+          <a:bodyPr wrap="none" rtlCol="0">
+            <a:spAutoFit/>
+          </a:bodyPr>
+          <a:lstStyle/>
+          <a:p>
+            <a:pPr algn="ctr"/>
+            <a:r>
+              <a:rPr lang="en-US" sz="2000" dirty="0">
+                <a:solidFill>
+                  <a:schemeClr val="accent1"/>
+                </a:solidFill>
+              </a:rPr>
+              <a:t>Continuous-valued outcome,</a:t>
+            </a:r>
+          </a:p>
+          <a:p>
+            <a:pPr algn="ctr"/>
+            <a:r>
+              <a:rPr lang="en-US" sz="2000" dirty="0">
+                <a:solidFill>
+                  <a:schemeClr val="accent1"/>
+                </a:solidFill>
+              </a:rPr>
+              <a:t>fitting a line = </a:t>
+            </a:r>
+            <a:r>
+              <a:rPr lang="en-US" sz="2000" dirty="0" err="1">
+                <a:solidFill>
+                  <a:schemeClr val="accent1"/>
+                </a:solidFill>
+              </a:rPr>
+              <a:t>lm</a:t>
+            </a:r>
+            <a:r>
+              <a:rPr lang="en-US" sz="2000" dirty="0">
+                <a:solidFill>
+                  <a:schemeClr val="accent1"/>
+                </a:solidFill>
+              </a:rPr>
+              <a:t>()</a:t>
+            </a:r>
+          </a:p>
+        </p:txBody>
+      </p:sp>
+      <p:sp>
+        <p:nvSpPr>
+          <p:cNvPr id="12" name="TextBox 11">
+            <a:extLst>
+              <a:ext uri="{FF2B5EF4-FFF2-40B4-BE49-F238E27FC236}">
+                <a16:creationId xmlns:a16="http://schemas.microsoft.com/office/drawing/2014/main" id="{2C7C9E92-8227-C3F3-CAAF-71C1ECA49929}"/>
+              </a:ext>
+            </a:extLst>
+          </p:cNvPr>
+          <p:cNvSpPr txBox="1"/>
+          <p:nvPr/>
+        </p:nvSpPr>
+        <p:spPr>
+          <a:xfrm>
+            <a:off x="6383732" y="1280442"/>
+            <a:ext cx="2789546" cy="707886"/>
+          </a:xfrm>
+          <a:prstGeom prst="rect">
+            <a:avLst/>
+          </a:prstGeom>
+          <a:noFill/>
+        </p:spPr>
+        <p:txBody>
+          <a:bodyPr wrap="none" rtlCol="0">
+            <a:spAutoFit/>
+          </a:bodyPr>
+          <a:lstStyle/>
+          <a:p>
+            <a:pPr algn="ctr"/>
+            <a:r>
+              <a:rPr lang="en-US" sz="2000" dirty="0">
+                <a:solidFill>
+                  <a:schemeClr val="accent1"/>
+                </a:solidFill>
+              </a:rPr>
+              <a:t>Binary response, </a:t>
+            </a:r>
+          </a:p>
+          <a:p>
+            <a:pPr algn="ctr"/>
+            <a:r>
+              <a:rPr lang="en-US" sz="2000" dirty="0">
+                <a:solidFill>
+                  <a:schemeClr val="accent1"/>
+                </a:solidFill>
+              </a:rPr>
+              <a:t>*-seq assay count data</a:t>
+            </a:r>
+          </a:p>
+        </p:txBody>
+      </p:sp>
+      <p:sp>
+        <p:nvSpPr>
+          <p:cNvPr id="13" name="TextBox 12">
+            <a:extLst>
+              <a:ext uri="{FF2B5EF4-FFF2-40B4-BE49-F238E27FC236}">
+                <a16:creationId xmlns:a16="http://schemas.microsoft.com/office/drawing/2014/main" id="{403BD9E9-C0D7-3D19-12EF-7BB50C60EDC9}"/>
+              </a:ext>
+            </a:extLst>
+          </p:cNvPr>
+          <p:cNvSpPr txBox="1"/>
+          <p:nvPr/>
+        </p:nvSpPr>
+        <p:spPr>
+          <a:xfrm>
+            <a:off x="10087564" y="2486043"/>
+            <a:ext cx="1638590" cy="400110"/>
+          </a:xfrm>
+          <a:prstGeom prst="rect">
+            <a:avLst/>
+          </a:prstGeom>
+          <a:noFill/>
+        </p:spPr>
+        <p:txBody>
+          <a:bodyPr wrap="none" rtlCol="0">
+            <a:spAutoFit/>
+          </a:bodyPr>
+          <a:lstStyle/>
+          <a:p>
+            <a:pPr algn="ctr"/>
+            <a:r>
+              <a:rPr lang="en-US" sz="2000" dirty="0">
+                <a:solidFill>
+                  <a:schemeClr val="accent1"/>
+                </a:solidFill>
+              </a:rPr>
+              <a:t>Still others…</a:t>
+            </a:r>
+          </a:p>
+        </p:txBody>
+      </p:sp>
+      <p:sp>
+        <p:nvSpPr>
+          <p:cNvPr id="14" name="TextBox 13">
+            <a:extLst>
+              <a:ext uri="{FF2B5EF4-FFF2-40B4-BE49-F238E27FC236}">
+                <a16:creationId xmlns:a16="http://schemas.microsoft.com/office/drawing/2014/main" id="{CB225CA9-28A1-F30D-A7E5-7FE17B2A26FA}"/>
+              </a:ext>
+            </a:extLst>
+          </p:cNvPr>
+          <p:cNvSpPr txBox="1"/>
+          <p:nvPr/>
+        </p:nvSpPr>
+        <p:spPr>
+          <a:xfrm>
+            <a:off x="9591435" y="3075057"/>
+            <a:ext cx="2433680" cy="1015663"/>
+          </a:xfrm>
+          <a:prstGeom prst="rect">
+            <a:avLst/>
+          </a:prstGeom>
+          <a:noFill/>
+        </p:spPr>
+        <p:txBody>
+          <a:bodyPr wrap="none" rtlCol="0">
+            <a:spAutoFit/>
+          </a:bodyPr>
+          <a:lstStyle/>
+          <a:p>
+            <a:pPr algn="ctr"/>
+            <a:r>
+              <a:rPr lang="en-US" sz="2000" i="1" dirty="0">
+                <a:solidFill>
+                  <a:schemeClr val="accent1"/>
+                </a:solidFill>
+              </a:rPr>
+              <a:t>Important:</a:t>
+            </a:r>
+            <a:br>
+              <a:rPr lang="en-US" sz="2000" i="1" dirty="0">
+                <a:solidFill>
+                  <a:schemeClr val="accent1"/>
+                </a:solidFill>
+              </a:rPr>
+            </a:br>
+            <a:r>
+              <a:rPr lang="en-US" sz="2000" dirty="0">
+                <a:solidFill>
+                  <a:schemeClr val="accent1"/>
+                </a:solidFill>
+              </a:rPr>
+              <a:t>Model selection</a:t>
+            </a:r>
+            <a:br>
+              <a:rPr lang="en-US" sz="2000" dirty="0">
+                <a:solidFill>
+                  <a:schemeClr val="accent1"/>
+                </a:solidFill>
+              </a:rPr>
+            </a:br>
+            <a:r>
+              <a:rPr lang="en-US" sz="2000" dirty="0">
+                <a:solidFill>
+                  <a:schemeClr val="accent1"/>
+                </a:solidFill>
+              </a:rPr>
+              <a:t>must be data driven</a:t>
+            </a:r>
+          </a:p>
+        </p:txBody>
+      </p:sp>
+      <p:pic>
+        <p:nvPicPr>
+          <p:cNvPr id="20" name="Picture 19" descr="A picture containing text, screenshot, line, plot&#10;&#10;Description automatically generated">
+            <a:extLst>
+              <a:ext uri="{FF2B5EF4-FFF2-40B4-BE49-F238E27FC236}">
+                <a16:creationId xmlns:a16="http://schemas.microsoft.com/office/drawing/2014/main" id="{3AB5968E-CCD2-C218-68AD-EE36013181D8}"/>
+              </a:ext>
+            </a:extLst>
+          </p:cNvPr>
+          <p:cNvPicPr>
+            <a:picLocks noChangeAspect="1"/>
+          </p:cNvPicPr>
+          <p:nvPr/>
+        </p:nvPicPr>
+        <p:blipFill>
+          <a:blip r:embed="rId3"/>
+          <a:stretch>
+            <a:fillRect/>
+          </a:stretch>
+        </p:blipFill>
+        <p:spPr>
+          <a:xfrm>
+            <a:off x="6112370" y="1988328"/>
+            <a:ext cx="3060908" cy="3609799"/>
+          </a:xfrm>
+          <a:prstGeom prst="rect">
+            <a:avLst/>
+          </a:prstGeom>
+        </p:spPr>
+      </p:pic>
+      <p:sp>
+        <p:nvSpPr>
+          <p:cNvPr id="21" name="TextBox 20">
+            <a:extLst>
+              <a:ext uri="{FF2B5EF4-FFF2-40B4-BE49-F238E27FC236}">
+                <a16:creationId xmlns:a16="http://schemas.microsoft.com/office/drawing/2014/main" id="{D1FC46E0-9CA3-19E8-8BFF-520F3011BFC3}"/>
+              </a:ext>
+            </a:extLst>
+          </p:cNvPr>
+          <p:cNvSpPr txBox="1"/>
+          <p:nvPr/>
+        </p:nvSpPr>
+        <p:spPr>
+          <a:xfrm>
+            <a:off x="5296669" y="5611992"/>
+            <a:ext cx="4692310" cy="400110"/>
+          </a:xfrm>
+          <a:prstGeom prst="rect">
+            <a:avLst/>
+          </a:prstGeom>
+          <a:noFill/>
+        </p:spPr>
+        <p:txBody>
+          <a:bodyPr wrap="none" rtlCol="0">
+            <a:spAutoFit/>
+          </a:bodyPr>
+          <a:lstStyle/>
+          <a:p>
+            <a:r>
+              <a:rPr lang="en-US" sz="2000" dirty="0" err="1">
+                <a:solidFill>
+                  <a:schemeClr val="accent1"/>
+                </a:solidFill>
+              </a:rPr>
+              <a:t>glm</a:t>
+            </a:r>
+            <a:r>
+              <a:rPr lang="en-US" sz="2000" dirty="0">
+                <a:solidFill>
+                  <a:schemeClr val="accent1"/>
+                </a:solidFill>
+              </a:rPr>
+              <a:t>(y ~ x, data = </a:t>
+            </a:r>
+            <a:r>
+              <a:rPr lang="en-US" sz="2000" dirty="0" err="1">
+                <a:solidFill>
+                  <a:schemeClr val="accent1"/>
+                </a:solidFill>
+              </a:rPr>
+              <a:t>df</a:t>
+            </a:r>
+            <a:r>
+              <a:rPr lang="en-US" sz="2000" dirty="0">
+                <a:solidFill>
+                  <a:schemeClr val="accent1"/>
+                </a:solidFill>
+              </a:rPr>
+              <a:t>, family = “binomial”)</a:t>
+            </a:r>
+          </a:p>
+        </p:txBody>
+      </p:sp>
+    </p:spTree>
+    <p:extLst>
+      <p:ext uri="{BB962C8B-B14F-4D97-AF65-F5344CB8AC3E}">
+        <p14:creationId xmlns:p14="http://schemas.microsoft.com/office/powerpoint/2010/main" val="4036545402"/>
+      </p:ext>
+    </p:extLst>
+  </p:cSld>
+  <p:clrMapOvr>
+    <a:masterClrMapping/>
+  </p:clrMapOvr>
+</p:sld>
+</file>
+
+<file path=ppt/slides/slide6.xml><?xml version="1.0" encoding="utf-8"?>
+<p:sld xmlns:a="http://schemas.openxmlformats.org/drawingml/2006/main" xmlns:r="http://schemas.openxmlformats.org/officeDocument/2006/relationships" xmlns:p="http://schemas.openxmlformats.org/presentationml/2006/main">
+  <p:cSld>
+    <p:spTree>
+      <p:nvGrpSpPr>
+        <p:cNvPr id="1" name=""/>
+        <p:cNvGrpSpPr/>
+        <p:nvPr/>
+      </p:nvGrpSpPr>
+      <p:grpSpPr>
+        <a:xfrm>
+          <a:off x="0" y="0"/>
+          <a:ext cx="0" cy="0"/>
+          <a:chOff x="0" y="0"/>
+          <a:chExt cx="0" cy="0"/>
+        </a:xfrm>
+      </p:grpSpPr>
+      <p:sp>
+        <p:nvSpPr>
+          <p:cNvPr id="2" name="Title 1">
+            <a:extLst>
+              <a:ext uri="{FF2B5EF4-FFF2-40B4-BE49-F238E27FC236}">
+                <a16:creationId xmlns:a16="http://schemas.microsoft.com/office/drawing/2014/main" id="{49F8DA4D-59A9-B98B-BD15-CCDC90F1C0B1}"/>
+              </a:ext>
+            </a:extLst>
+          </p:cNvPr>
+          <p:cNvSpPr>
+            <a:spLocks noGrp="1"/>
+          </p:cNvSpPr>
+          <p:nvPr>
+            <p:ph type="title"/>
+          </p:nvPr>
+        </p:nvSpPr>
+        <p:spPr/>
+        <p:txBody>
+          <a:bodyPr/>
+          <a:lstStyle/>
+          <a:p>
+            <a:r>
+              <a:rPr lang="en-US" dirty="0"/>
+              <a:t>Model fitting notation in R</a:t>
+            </a:r>
+          </a:p>
+        </p:txBody>
+      </p:sp>
+      <p:sp>
+        <p:nvSpPr>
+          <p:cNvPr id="5" name="TextBox 4">
+            <a:extLst>
+              <a:ext uri="{FF2B5EF4-FFF2-40B4-BE49-F238E27FC236}">
+                <a16:creationId xmlns:a16="http://schemas.microsoft.com/office/drawing/2014/main" id="{F4DD3258-A58B-A5D1-3E92-0D1662B01EA8}"/>
+              </a:ext>
+            </a:extLst>
+          </p:cNvPr>
+          <p:cNvSpPr txBox="1"/>
+          <p:nvPr/>
+        </p:nvSpPr>
+        <p:spPr>
+          <a:xfrm>
+            <a:off x="6567816" y="1691863"/>
+            <a:ext cx="3698448" cy="830997"/>
+          </a:xfrm>
+          <a:prstGeom prst="rect">
+            <a:avLst/>
+          </a:prstGeom>
+          <a:noFill/>
+        </p:spPr>
+        <p:txBody>
+          <a:bodyPr wrap="none" rtlCol="0">
+            <a:spAutoFit/>
+          </a:bodyPr>
+          <a:lstStyle/>
+          <a:p>
+            <a:r>
+              <a:rPr lang="en-US" sz="2400" b="1" dirty="0" err="1">
+                <a:solidFill>
+                  <a:schemeClr val="accent1"/>
+                </a:solidFill>
+              </a:rPr>
+              <a:t>lm</a:t>
+            </a:r>
+            <a:r>
+              <a:rPr lang="en-US" sz="2400" dirty="0">
+                <a:solidFill>
+                  <a:schemeClr val="tx2">
+                    <a:lumMod val="25000"/>
+                  </a:schemeClr>
+                </a:solidFill>
+              </a:rPr>
+              <a:t>(Income ~ </a:t>
+            </a:r>
+            <a:r>
+              <a:rPr lang="en-US" sz="2400" dirty="0" err="1">
+                <a:solidFill>
+                  <a:schemeClr val="tx2">
+                    <a:lumMod val="25000"/>
+                  </a:schemeClr>
+                </a:solidFill>
+              </a:rPr>
+              <a:t>PctLiteracy</a:t>
+            </a:r>
+            <a:r>
+              <a:rPr lang="en-US" sz="2400" dirty="0">
+                <a:solidFill>
+                  <a:schemeClr val="tx2">
+                    <a:lumMod val="25000"/>
+                  </a:schemeClr>
+                </a:solidFill>
+              </a:rPr>
+              <a:t>, </a:t>
+            </a:r>
+          </a:p>
+          <a:p>
+            <a:r>
+              <a:rPr lang="en-US" sz="2400" dirty="0">
+                <a:solidFill>
+                  <a:schemeClr val="tx2">
+                    <a:lumMod val="25000"/>
+                  </a:schemeClr>
+                </a:solidFill>
+              </a:rPr>
+              <a:t>      data = </a:t>
+            </a:r>
+            <a:r>
+              <a:rPr lang="en-US" sz="2400" dirty="0" err="1">
+                <a:solidFill>
+                  <a:schemeClr val="tx2">
+                    <a:lumMod val="25000"/>
+                  </a:schemeClr>
+                </a:solidFill>
+              </a:rPr>
+              <a:t>dat</a:t>
+            </a:r>
+            <a:r>
+              <a:rPr lang="en-US" sz="2400" dirty="0">
+                <a:solidFill>
+                  <a:schemeClr val="tx2">
+                    <a:lumMod val="25000"/>
+                  </a:schemeClr>
+                </a:solidFill>
+              </a:rPr>
+              <a:t>)</a:t>
+            </a:r>
+          </a:p>
+        </p:txBody>
+      </p:sp>
+      <p:pic>
+        <p:nvPicPr>
+          <p:cNvPr id="6" name="Picture 5">
+            <a:extLst>
+              <a:ext uri="{FF2B5EF4-FFF2-40B4-BE49-F238E27FC236}">
+                <a16:creationId xmlns:a16="http://schemas.microsoft.com/office/drawing/2014/main" id="{E5D4047E-BEF2-D27D-402F-FB0BAC23298A}"/>
+              </a:ext>
+            </a:extLst>
+          </p:cNvPr>
+          <p:cNvPicPr>
+            <a:picLocks noChangeAspect="1"/>
+          </p:cNvPicPr>
+          <p:nvPr/>
+        </p:nvPicPr>
+        <p:blipFill>
+          <a:blip r:embed="rId2"/>
+          <a:stretch>
+            <a:fillRect/>
+          </a:stretch>
+        </p:blipFill>
+        <p:spPr>
+          <a:xfrm>
+            <a:off x="182089" y="3270792"/>
+            <a:ext cx="6384218" cy="307173"/>
+          </a:xfrm>
+          <a:prstGeom prst="rect">
+            <a:avLst/>
+          </a:prstGeom>
+        </p:spPr>
+      </p:pic>
+      <p:sp>
+        <p:nvSpPr>
+          <p:cNvPr id="7" name="TextBox 6">
+            <a:extLst>
+              <a:ext uri="{FF2B5EF4-FFF2-40B4-BE49-F238E27FC236}">
+                <a16:creationId xmlns:a16="http://schemas.microsoft.com/office/drawing/2014/main" id="{663E005B-7453-B85A-5877-9D14C895C1B9}"/>
+              </a:ext>
+            </a:extLst>
+          </p:cNvPr>
+          <p:cNvSpPr txBox="1"/>
+          <p:nvPr/>
+        </p:nvSpPr>
+        <p:spPr>
+          <a:xfrm>
+            <a:off x="6567816" y="3134812"/>
+            <a:ext cx="5370381" cy="1200329"/>
+          </a:xfrm>
+          <a:prstGeom prst="rect">
+            <a:avLst/>
+          </a:prstGeom>
+          <a:noFill/>
+        </p:spPr>
+        <p:txBody>
+          <a:bodyPr wrap="none" rtlCol="0">
+            <a:spAutoFit/>
+          </a:bodyPr>
+          <a:lstStyle/>
+          <a:p>
+            <a:r>
+              <a:rPr lang="en-US" sz="2400" b="1" dirty="0" err="1">
+                <a:solidFill>
+                  <a:schemeClr val="accent1"/>
+                </a:solidFill>
+              </a:rPr>
+              <a:t>glm</a:t>
+            </a:r>
+            <a:r>
+              <a:rPr lang="en-US" sz="2400" dirty="0">
+                <a:solidFill>
+                  <a:schemeClr val="tx2">
+                    <a:lumMod val="25000"/>
+                  </a:schemeClr>
+                </a:solidFill>
+              </a:rPr>
+              <a:t>(diabetes ~ glucose + pregnancy, </a:t>
+            </a:r>
+          </a:p>
+          <a:p>
+            <a:r>
+              <a:rPr lang="en-US" sz="2400" dirty="0">
+                <a:solidFill>
+                  <a:schemeClr val="tx2">
+                    <a:lumMod val="25000"/>
+                  </a:schemeClr>
+                </a:solidFill>
+              </a:rPr>
+              <a:t>       data = </a:t>
+            </a:r>
+            <a:r>
+              <a:rPr lang="en-US" sz="2400" dirty="0" err="1">
+                <a:solidFill>
+                  <a:schemeClr val="tx2">
+                    <a:lumMod val="25000"/>
+                  </a:schemeClr>
+                </a:solidFill>
+              </a:rPr>
+              <a:t>dat</a:t>
+            </a:r>
+            <a:r>
+              <a:rPr lang="en-US" sz="2400" dirty="0">
+                <a:solidFill>
+                  <a:schemeClr val="tx2">
+                    <a:lumMod val="25000"/>
+                  </a:schemeClr>
+                </a:solidFill>
+              </a:rPr>
+              <a:t>,</a:t>
+            </a:r>
+          </a:p>
+          <a:p>
+            <a:r>
+              <a:rPr lang="en-US" sz="2400" dirty="0">
+                <a:solidFill>
+                  <a:schemeClr val="tx2">
+                    <a:lumMod val="25000"/>
+                  </a:schemeClr>
+                </a:solidFill>
+              </a:rPr>
+              <a:t>       family = “</a:t>
+            </a:r>
+            <a:r>
+              <a:rPr lang="en-US" sz="2400" b="1" dirty="0">
+                <a:solidFill>
+                  <a:schemeClr val="accent1"/>
+                </a:solidFill>
+              </a:rPr>
+              <a:t>binomial</a:t>
+            </a:r>
+            <a:r>
+              <a:rPr lang="en-US" sz="2400" dirty="0">
+                <a:solidFill>
+                  <a:schemeClr val="tx2">
+                    <a:lumMod val="25000"/>
+                  </a:schemeClr>
+                </a:solidFill>
+              </a:rPr>
+              <a:t>”)</a:t>
+            </a:r>
+          </a:p>
+        </p:txBody>
+      </p:sp>
+      <p:pic>
+        <p:nvPicPr>
+          <p:cNvPr id="8" name="Picture 7">
+            <a:extLst>
+              <a:ext uri="{FF2B5EF4-FFF2-40B4-BE49-F238E27FC236}">
+                <a16:creationId xmlns:a16="http://schemas.microsoft.com/office/drawing/2014/main" id="{F613755E-9379-EB5D-96F7-DE10E1A102A6}"/>
+              </a:ext>
+            </a:extLst>
+          </p:cNvPr>
+          <p:cNvPicPr>
+            <a:picLocks noChangeAspect="1"/>
+          </p:cNvPicPr>
+          <p:nvPr/>
+        </p:nvPicPr>
+        <p:blipFill>
+          <a:blip r:embed="rId3"/>
+          <a:stretch>
+            <a:fillRect/>
+          </a:stretch>
+        </p:blipFill>
+        <p:spPr>
+          <a:xfrm>
+            <a:off x="941880" y="1900466"/>
+            <a:ext cx="4682305" cy="307173"/>
+          </a:xfrm>
+          <a:prstGeom prst="rect">
+            <a:avLst/>
+          </a:prstGeom>
+        </p:spPr>
+      </p:pic>
+    </p:spTree>
+    <p:extLst>
+      <p:ext uri="{BB962C8B-B14F-4D97-AF65-F5344CB8AC3E}">
+        <p14:creationId xmlns:p14="http://schemas.microsoft.com/office/powerpoint/2010/main" val="2477225592"/>
+      </p:ext>
+    </p:extLst>
+  </p:cSld>
+  <p:clrMapOvr>
+    <a:masterClrMapping/>
+  </p:clrMapOvr>
+</p:sld>
+</file>
+
+<file path=ppt/slides/slide7.xml><?xml version="1.0" encoding="utf-8"?>
 <p:sld xmlns:a="http://schemas.openxmlformats.org/drawingml/2006/main" xmlns:r="http://schemas.openxmlformats.org/officeDocument/2006/relationships" xmlns:p="http://schemas.openxmlformats.org/presentationml/2006/main">
   <p:cSld>
     <p:spTree>
@@ -12308,7 +13118,7 @@
 </p:sld>
 </file>
 
-<file path=ppt/slides/slide6.xml><?xml version="1.0" encoding="utf-8"?>
+<file path=ppt/slides/slide8.xml><?xml version="1.0" encoding="utf-8"?>
 <p:sld xmlns:a="http://schemas.openxmlformats.org/drawingml/2006/main" xmlns:r="http://schemas.openxmlformats.org/officeDocument/2006/relationships" xmlns:p="http://schemas.openxmlformats.org/presentationml/2006/main">
   <p:cSld>
     <p:spTree>

</xml_diff>